<commit_message>
Presentation for class 6_01_2022
</commit_message>
<xml_diff>
--- a/20220601_OAC_Presentation_for_demo.pptx
+++ b/20220601_OAC_Presentation_for_demo.pptx
@@ -10,12 +10,12 @@
     <p:sldId id="263" r:id="rId4"/>
     <p:sldId id="281" r:id="rId5"/>
     <p:sldId id="267" r:id="rId6"/>
-    <p:sldId id="280" r:id="rId7"/>
-    <p:sldId id="261" r:id="rId8"/>
-    <p:sldId id="278" r:id="rId9"/>
-    <p:sldId id="275" r:id="rId10"/>
-    <p:sldId id="276" r:id="rId11"/>
-    <p:sldId id="277" r:id="rId12"/>
+    <p:sldId id="278" r:id="rId7"/>
+    <p:sldId id="275" r:id="rId8"/>
+    <p:sldId id="276" r:id="rId9"/>
+    <p:sldId id="277" r:id="rId10"/>
+    <p:sldId id="280" r:id="rId11"/>
+    <p:sldId id="261" r:id="rId12"/>
     <p:sldId id="258" r:id="rId13"/>
     <p:sldId id="259" r:id="rId14"/>
     <p:sldId id="262" r:id="rId15"/>
@@ -6403,12 +6403,329 @@
           <a:chExt cx="0" cy="0"/>
         </a:xfrm>
       </p:grpSpPr>
+      <p:sp>
+        <p:nvSpPr>
+          <p:cNvPr id="3" name="TextBox 2">
+            <a:extLst>
+              <a:ext uri="{FF2B5EF4-FFF2-40B4-BE49-F238E27FC236}">
+                <a16:creationId xmlns:a16="http://schemas.microsoft.com/office/drawing/2014/main" id="{34CE54B5-7E96-75C6-C8F4-45E78D224FCF}"/>
+              </a:ext>
+            </a:extLst>
+          </p:cNvPr>
+          <p:cNvSpPr txBox="1"/>
+          <p:nvPr/>
+        </p:nvSpPr>
+        <p:spPr>
+          <a:xfrm>
+            <a:off x="838954" y="1471136"/>
+            <a:ext cx="10800932" cy="4524315"/>
+          </a:xfrm>
+          <a:prstGeom prst="rect">
+            <a:avLst/>
+          </a:prstGeom>
+          <a:noFill/>
+        </p:spPr>
+        <p:txBody>
+          <a:bodyPr wrap="square" rtlCol="0">
+            <a:spAutoFit/>
+          </a:bodyPr>
+          <a:lstStyle/>
+          <a:p>
+            <a:pPr marL="628650" lvl="1" indent="-171450">
+              <a:buFont typeface="Arial" panose="020B0604020202020204" pitchFamily="34" charset="0"/>
+              <a:buChar char="•"/>
+            </a:pPr>
+            <a:r>
+              <a:rPr lang="en-US" sz="1600" b="0" i="0" dirty="0">
+                <a:solidFill>
+                  <a:srgbClr val="202124"/>
+                </a:solidFill>
+                <a:effectLst/>
+              </a:rPr>
+              <a:t>As a gamer, I want to:</a:t>
+            </a:r>
+          </a:p>
+          <a:p>
+            <a:pPr marL="1085850" lvl="2" indent="-171450">
+              <a:buFont typeface="Arial" panose="020B0604020202020204" pitchFamily="34" charset="0"/>
+              <a:buChar char="•"/>
+            </a:pPr>
+            <a:r>
+              <a:rPr lang="en-US" sz="1600" dirty="0">
+                <a:solidFill>
+                  <a:srgbClr val="202124"/>
+                </a:solidFill>
+              </a:rPr>
+              <a:t>H</a:t>
+            </a:r>
+            <a:r>
+              <a:rPr lang="en-US" sz="1600" b="0" i="0" dirty="0">
+                <a:solidFill>
+                  <a:srgbClr val="202124"/>
+                </a:solidFill>
+                <a:effectLst/>
+              </a:rPr>
+              <a:t>ave fun while having the chance to earn tokens so I feel that my time is well spent. </a:t>
+            </a:r>
+          </a:p>
+          <a:p>
+            <a:pPr marL="1085850" lvl="2" indent="-171450">
+              <a:buFont typeface="Arial" panose="020B0604020202020204" pitchFamily="34" charset="0"/>
+              <a:buChar char="•"/>
+            </a:pPr>
+            <a:r>
+              <a:rPr lang="en-US" sz="1600" dirty="0">
+                <a:solidFill>
+                  <a:srgbClr val="202124"/>
+                </a:solidFill>
+              </a:rPr>
+              <a:t>B</a:t>
+            </a:r>
+            <a:r>
+              <a:rPr lang="en-US" sz="1600" b="0" i="0" dirty="0">
+                <a:solidFill>
+                  <a:srgbClr val="202124"/>
+                </a:solidFill>
+                <a:effectLst/>
+              </a:rPr>
+              <a:t>e able to create a character as an NFT so that I have the possibility of re-selling the NFT in the future. </a:t>
+            </a:r>
+          </a:p>
+          <a:p>
+            <a:pPr marL="1085850" lvl="2" indent="-171450">
+              <a:buFont typeface="Arial" panose="020B0604020202020204" pitchFamily="34" charset="0"/>
+              <a:buChar char="•"/>
+            </a:pPr>
+            <a:r>
+              <a:rPr lang="en-US" sz="1600" dirty="0">
+                <a:solidFill>
+                  <a:srgbClr val="202124"/>
+                </a:solidFill>
+              </a:rPr>
+              <a:t>Know t</a:t>
+            </a:r>
+            <a:r>
+              <a:rPr lang="en-US" sz="1600" b="0" i="0" dirty="0">
+                <a:solidFill>
+                  <a:srgbClr val="202124"/>
+                </a:solidFill>
+                <a:effectLst/>
+              </a:rPr>
+              <a:t>he game to be set up in a transparent way so that I can compete and trust the result, win or lose. </a:t>
+            </a:r>
+          </a:p>
+          <a:p>
+            <a:pPr marL="1085850" lvl="2" indent="-171450">
+              <a:buFont typeface="Arial" panose="020B0604020202020204" pitchFamily="34" charset="0"/>
+              <a:buChar char="•"/>
+            </a:pPr>
+            <a:r>
+              <a:rPr lang="en-US" sz="1600" dirty="0">
+                <a:solidFill>
+                  <a:srgbClr val="202124"/>
+                </a:solidFill>
+              </a:rPr>
+              <a:t>E</a:t>
+            </a:r>
+            <a:r>
+              <a:rPr lang="en-US" sz="1600" b="0" i="0" dirty="0">
+                <a:solidFill>
+                  <a:srgbClr val="202124"/>
+                </a:solidFill>
+                <a:effectLst/>
+              </a:rPr>
+              <a:t>nsure that the transfer of tokens is secure so that I do not lose value. </a:t>
+            </a:r>
+          </a:p>
+          <a:p>
+            <a:pPr marL="628650" lvl="1" indent="-171450">
+              <a:buFont typeface="Arial" panose="020B0604020202020204" pitchFamily="34" charset="0"/>
+              <a:buChar char="•"/>
+            </a:pPr>
+            <a:endParaRPr lang="en-US" sz="1600" dirty="0">
+              <a:solidFill>
+                <a:srgbClr val="202124"/>
+              </a:solidFill>
+            </a:endParaRPr>
+          </a:p>
+          <a:p>
+            <a:pPr marL="628650" lvl="1" indent="-171450">
+              <a:buFont typeface="Arial" panose="020B0604020202020204" pitchFamily="34" charset="0"/>
+              <a:buChar char="•"/>
+            </a:pPr>
+            <a:r>
+              <a:rPr lang="en-US" sz="1600" b="0" i="0" dirty="0">
+                <a:solidFill>
+                  <a:srgbClr val="202124"/>
+                </a:solidFill>
+                <a:effectLst/>
+              </a:rPr>
+              <a:t>As a game administrator, I want to:</a:t>
+            </a:r>
+          </a:p>
+          <a:p>
+            <a:pPr marL="1085850" lvl="2" indent="-171450">
+              <a:buFont typeface="Arial" panose="020B0604020202020204" pitchFamily="34" charset="0"/>
+              <a:buChar char="•"/>
+            </a:pPr>
+            <a:r>
+              <a:rPr lang="en-US" sz="1600" dirty="0">
+                <a:solidFill>
+                  <a:srgbClr val="202124"/>
+                </a:solidFill>
+              </a:rPr>
+              <a:t>E</a:t>
+            </a:r>
+            <a:r>
+              <a:rPr lang="en-US" sz="1600" b="0" i="0" dirty="0">
+                <a:solidFill>
+                  <a:srgbClr val="202124"/>
+                </a:solidFill>
+                <a:effectLst/>
+              </a:rPr>
+              <a:t>nsure that the treasury component of the blockchain is accurately accounting for token transfers so that no tokens are misdirected. </a:t>
+            </a:r>
+          </a:p>
+          <a:p>
+            <a:pPr marL="1085850" lvl="2" indent="-171450">
+              <a:buFont typeface="Arial" panose="020B0604020202020204" pitchFamily="34" charset="0"/>
+              <a:buChar char="•"/>
+            </a:pPr>
+            <a:r>
+              <a:rPr lang="en-US" sz="1600" dirty="0">
+                <a:solidFill>
+                  <a:srgbClr val="202124"/>
+                </a:solidFill>
+              </a:rPr>
+              <a:t>M</a:t>
+            </a:r>
+            <a:r>
+              <a:rPr lang="en-US" sz="1600" b="0" i="0" dirty="0">
+                <a:solidFill>
+                  <a:srgbClr val="202124"/>
+                </a:solidFill>
+                <a:effectLst/>
+              </a:rPr>
+              <a:t>ake sure that the game code is secure so that no unauthorized people can mint new tokens or steal tokens.</a:t>
+            </a:r>
+          </a:p>
+          <a:p>
+            <a:pPr marL="628650" lvl="1" indent="-171450">
+              <a:buFont typeface="Arial" panose="020B0604020202020204" pitchFamily="34" charset="0"/>
+              <a:buChar char="•"/>
+            </a:pPr>
+            <a:endParaRPr lang="en-US" sz="1600" dirty="0">
+              <a:solidFill>
+                <a:srgbClr val="202124"/>
+              </a:solidFill>
+            </a:endParaRPr>
+          </a:p>
+          <a:p>
+            <a:pPr marL="628650" lvl="1" indent="-171450">
+              <a:buFont typeface="Arial" panose="020B0604020202020204" pitchFamily="34" charset="0"/>
+              <a:buChar char="•"/>
+            </a:pPr>
+            <a:r>
+              <a:rPr lang="en-US" sz="1600" b="0" i="0" dirty="0">
+                <a:solidFill>
+                  <a:srgbClr val="202124"/>
+                </a:solidFill>
+                <a:effectLst/>
+              </a:rPr>
+              <a:t>As a game designer, I want to:</a:t>
+            </a:r>
+          </a:p>
+          <a:p>
+            <a:pPr marL="1085850" lvl="2" indent="-171450">
+              <a:buFont typeface="Arial" panose="020B0604020202020204" pitchFamily="34" charset="0"/>
+              <a:buChar char="•"/>
+            </a:pPr>
+            <a:r>
+              <a:rPr lang="en-US" sz="1600" dirty="0">
+                <a:solidFill>
+                  <a:srgbClr val="202124"/>
+                </a:solidFill>
+              </a:rPr>
+              <a:t>E</a:t>
+            </a:r>
+            <a:r>
+              <a:rPr lang="en-US" sz="1600" b="0" i="0" dirty="0">
+                <a:solidFill>
+                  <a:srgbClr val="202124"/>
+                </a:solidFill>
+                <a:effectLst/>
+              </a:rPr>
+              <a:t>nsure that all of the technology works together to create a seamless and easy experience for gamers.</a:t>
+            </a:r>
+          </a:p>
+          <a:p>
+            <a:pPr marL="1085850" lvl="2" indent="-171450">
+              <a:buFont typeface="Arial" panose="020B0604020202020204" pitchFamily="34" charset="0"/>
+              <a:buChar char="•"/>
+            </a:pPr>
+            <a:r>
+              <a:rPr lang="en-US" sz="1600" b="0" i="0" dirty="0">
+                <a:solidFill>
+                  <a:srgbClr val="202124"/>
+                </a:solidFill>
+                <a:effectLst/>
+              </a:rPr>
+              <a:t>Create a game that is fun to play and encourages gamers to return.</a:t>
+            </a:r>
+          </a:p>
+          <a:p>
+            <a:pPr marL="1085850" lvl="2" indent="-171450">
+              <a:buFont typeface="Arial" panose="020B0604020202020204" pitchFamily="34" charset="0"/>
+              <a:buChar char="•"/>
+            </a:pPr>
+            <a:r>
+              <a:rPr lang="en-US" sz="1600" b="0" i="0" dirty="0">
+                <a:solidFill>
+                  <a:srgbClr val="202124"/>
+                </a:solidFill>
+                <a:effectLst/>
+              </a:rPr>
+              <a:t>Provide a visually stunning and fun set of graphics in the game interface and character NFTs that create a unique look and brand for the game.</a:t>
+            </a:r>
+          </a:p>
+          <a:p>
+            <a:pPr marL="1085850" lvl="2" indent="-171450">
+              <a:buFont typeface="Arial" panose="020B0604020202020204" pitchFamily="34" charset="0"/>
+              <a:buChar char="•"/>
+            </a:pPr>
+            <a:r>
+              <a:rPr lang="en-US" sz="1600" b="0" i="0" dirty="0">
+                <a:solidFill>
+                  <a:srgbClr val="202124"/>
+                </a:solidFill>
+                <a:effectLst/>
+              </a:rPr>
+              <a:t>Charge a fee to make a profit from owning and running the game.</a:t>
+            </a:r>
+          </a:p>
+          <a:p>
+            <a:pPr marL="1085850" lvl="2" indent="-171450">
+              <a:buFont typeface="Arial" panose="020B0604020202020204" pitchFamily="34" charset="0"/>
+              <a:buChar char="•"/>
+            </a:pPr>
+            <a:r>
+              <a:rPr lang="en-US" sz="1600" b="0" i="0" dirty="0">
+                <a:solidFill>
+                  <a:srgbClr val="202124"/>
+                </a:solidFill>
+                <a:effectLst/>
+              </a:rPr>
+              <a:t>Market the game and create a strong community of passionate users who continue to play the game over time.</a:t>
+            </a:r>
+          </a:p>
+        </p:txBody>
+      </p:sp>
       <p:grpSp>
         <p:nvGrpSpPr>
           <p:cNvPr id="4" name="Group 3">
             <a:extLst>
               <a:ext uri="{FF2B5EF4-FFF2-40B4-BE49-F238E27FC236}">
-                <a16:creationId xmlns:a16="http://schemas.microsoft.com/office/drawing/2014/main" id="{DA452823-8805-6CA2-B24B-7CFD46842F39}"/>
+                <a16:creationId xmlns:a16="http://schemas.microsoft.com/office/drawing/2014/main" id="{47479E60-6B1A-7A4E-398B-3AC8A39B3B4D}"/>
               </a:ext>
             </a:extLst>
           </p:cNvPr>
@@ -6428,7 +6745,7 @@
             <p:cNvPr id="5" name="Rectangle 4">
               <a:extLst>
                 <a:ext uri="{FF2B5EF4-FFF2-40B4-BE49-F238E27FC236}">
-                  <a16:creationId xmlns:a16="http://schemas.microsoft.com/office/drawing/2014/main" id="{98F38B91-67F6-78EB-AC88-AD7E690C8751}"/>
+                  <a16:creationId xmlns:a16="http://schemas.microsoft.com/office/drawing/2014/main" id="{7D985D39-CAFE-2A5D-F9C3-973057171CFC}"/>
                 </a:ext>
               </a:extLst>
             </p:cNvPr>
@@ -6477,7 +6794,7 @@
                 <a:rPr lang="en-US" sz="2400" dirty="0">
                   <a:latin typeface="Copperplate Gothic Bold" panose="020E0705020206020404" pitchFamily="34" charset="0"/>
                 </a:rPr>
-                <a:t>Backend game setup</a:t>
+                <a:t>user stories</a:t>
               </a:r>
             </a:p>
           </p:txBody>
@@ -6487,7 +6804,7 @@
             <p:cNvPr id="6" name="Picture 5">
               <a:extLst>
                 <a:ext uri="{FF2B5EF4-FFF2-40B4-BE49-F238E27FC236}">
-                  <a16:creationId xmlns:a16="http://schemas.microsoft.com/office/drawing/2014/main" id="{F7AEB80D-B5C2-F6CE-5BD3-54119AFDD1B9}"/>
+                  <a16:creationId xmlns:a16="http://schemas.microsoft.com/office/drawing/2014/main" id="{193E25A5-0359-C35C-7F20-FA998A2DADEE}"/>
                 </a:ext>
               </a:extLst>
             </p:cNvPr>
@@ -6513,99 +6830,10 @@
           </p:spPr>
         </p:pic>
       </p:grpSp>
-      <p:sp>
-        <p:nvSpPr>
-          <p:cNvPr id="7" name="TextBox 6">
-            <a:extLst>
-              <a:ext uri="{FF2B5EF4-FFF2-40B4-BE49-F238E27FC236}">
-                <a16:creationId xmlns:a16="http://schemas.microsoft.com/office/drawing/2014/main" id="{077BDDE9-ADCB-AB0B-D817-F08752B35F48}"/>
-              </a:ext>
-            </a:extLst>
-          </p:cNvPr>
-          <p:cNvSpPr txBox="1"/>
-          <p:nvPr/>
-        </p:nvSpPr>
-        <p:spPr>
-          <a:xfrm>
-            <a:off x="549524" y="1792836"/>
-            <a:ext cx="2829401" cy="1846659"/>
-          </a:xfrm>
-          <a:prstGeom prst="rect">
-            <a:avLst/>
-          </a:prstGeom>
-          <a:noFill/>
-        </p:spPr>
-        <p:txBody>
-          <a:bodyPr wrap="square" rtlCol="0">
-            <a:spAutoFit/>
-          </a:bodyPr>
-          <a:lstStyle/>
-          <a:p>
-            <a:pPr algn="ctr"/>
-            <a:r>
-              <a:rPr lang="en-US" sz="2400" b="1" dirty="0"/>
-              <a:t>Remix Solidity</a:t>
-            </a:r>
-          </a:p>
-          <a:p>
-            <a:pPr algn="ctr"/>
-            <a:endParaRPr lang="en-US" dirty="0"/>
-          </a:p>
-          <a:p>
-            <a:pPr algn="ctr"/>
-            <a:r>
-              <a:rPr lang="en-US" dirty="0"/>
-              <a:t>NFT Character types initiated and create game</a:t>
-            </a:r>
-          </a:p>
-          <a:p>
-            <a:pPr algn="ctr"/>
-            <a:endParaRPr lang="en-US" dirty="0"/>
-          </a:p>
-          <a:p>
-            <a:pPr algn="ctr"/>
-            <a:r>
-              <a:rPr lang="en-US" dirty="0" err="1"/>
-              <a:t>OrderAndChaos.sol</a:t>
-            </a:r>
-            <a:endParaRPr lang="en-US" dirty="0"/>
-          </a:p>
-        </p:txBody>
-      </p:sp>
-      <p:pic>
-        <p:nvPicPr>
-          <p:cNvPr id="3" name="Picture 2">
-            <a:extLst>
-              <a:ext uri="{FF2B5EF4-FFF2-40B4-BE49-F238E27FC236}">
-                <a16:creationId xmlns:a16="http://schemas.microsoft.com/office/drawing/2014/main" id="{85889458-72D7-50C1-B0E7-BAAD248D5A4D}"/>
-              </a:ext>
-            </a:extLst>
-          </p:cNvPr>
-          <p:cNvPicPr>
-            <a:picLocks noChangeAspect="1"/>
-          </p:cNvPicPr>
-          <p:nvPr/>
-        </p:nvPicPr>
-        <p:blipFill>
-          <a:blip r:embed="rId3"/>
-          <a:stretch>
-            <a:fillRect/>
-          </a:stretch>
-        </p:blipFill>
-        <p:spPr>
-          <a:xfrm>
-            <a:off x="4815839" y="1367245"/>
-            <a:ext cx="6615406" cy="5234306"/>
-          </a:xfrm>
-          <a:prstGeom prst="rect">
-            <a:avLst/>
-          </a:prstGeom>
-        </p:spPr>
-      </p:pic>
     </p:spTree>
     <p:extLst>
       <p:ext uri="{BB962C8B-B14F-4D97-AF65-F5344CB8AC3E}">
-        <p14:creationId xmlns:p14="http://schemas.microsoft.com/office/powerpoint/2010/main" val="3298874469"/>
+        <p14:creationId xmlns:p14="http://schemas.microsoft.com/office/powerpoint/2010/main" val="1990386000"/>
       </p:ext>
     </p:extLst>
   </p:cSld>
@@ -6632,12 +6860,147 @@
           <a:chExt cx="0" cy="0"/>
         </a:xfrm>
       </p:grpSpPr>
+      <p:sp>
+        <p:nvSpPr>
+          <p:cNvPr id="2" name="TextBox 1">
+            <a:extLst>
+              <a:ext uri="{FF2B5EF4-FFF2-40B4-BE49-F238E27FC236}">
+                <a16:creationId xmlns:a16="http://schemas.microsoft.com/office/drawing/2014/main" id="{8C46D993-3F88-8E35-298C-E59D82DE74D4}"/>
+              </a:ext>
+            </a:extLst>
+          </p:cNvPr>
+          <p:cNvSpPr txBox="1"/>
+          <p:nvPr/>
+        </p:nvSpPr>
+        <p:spPr>
+          <a:xfrm>
+            <a:off x="970506" y="1992509"/>
+            <a:ext cx="9773320" cy="3231654"/>
+          </a:xfrm>
+          <a:prstGeom prst="rect">
+            <a:avLst/>
+          </a:prstGeom>
+          <a:noFill/>
+        </p:spPr>
+        <p:txBody>
+          <a:bodyPr wrap="square" rtlCol="0">
+            <a:spAutoFit/>
+          </a:bodyPr>
+          <a:lstStyle/>
+          <a:p>
+            <a:r>
+              <a:rPr lang="en-US" sz="2400" b="0" i="0" dirty="0">
+                <a:solidFill>
+                  <a:srgbClr val="202124"/>
+                </a:solidFill>
+                <a:effectLst/>
+              </a:rPr>
+              <a:t>The game must:</a:t>
+            </a:r>
+          </a:p>
+          <a:p>
+            <a:pPr marL="628650" lvl="1" indent="-171450">
+              <a:buFont typeface="Arial" panose="020B0604020202020204" pitchFamily="34" charset="0"/>
+              <a:buChar char="•"/>
+            </a:pPr>
+            <a:r>
+              <a:rPr lang="en-US" sz="2000" b="0" i="0" dirty="0">
+                <a:solidFill>
+                  <a:srgbClr val="202124"/>
+                </a:solidFill>
+                <a:effectLst/>
+              </a:rPr>
+              <a:t>Have an enticing story, theme, and user interface in order to attract players. </a:t>
+            </a:r>
+          </a:p>
+          <a:p>
+            <a:pPr marL="628650" lvl="1" indent="-171450">
+              <a:buFont typeface="Arial" panose="020B0604020202020204" pitchFamily="34" charset="0"/>
+              <a:buChar char="•"/>
+            </a:pPr>
+            <a:r>
+              <a:rPr lang="en-US" sz="2000" b="0" i="0" dirty="0">
+                <a:solidFill>
+                  <a:srgbClr val="202124"/>
+                </a:solidFill>
+                <a:effectLst/>
+              </a:rPr>
+              <a:t>Provide gameplay that offers reasonable challenge and rewards in order to keep players coming back. </a:t>
+            </a:r>
+          </a:p>
+          <a:p>
+            <a:pPr marL="628650" lvl="1" indent="-171450">
+              <a:buFont typeface="Arial" panose="020B0604020202020204" pitchFamily="34" charset="0"/>
+              <a:buChar char="•"/>
+            </a:pPr>
+            <a:r>
+              <a:rPr lang="en-US" sz="2000" b="0" i="0" dirty="0">
+                <a:solidFill>
+                  <a:srgbClr val="202124"/>
+                </a:solidFill>
+                <a:effectLst/>
+              </a:rPr>
+              <a:t>Produce a token and NFTs that are designed with appropriate standards so that they could be publicly traded in a future release. </a:t>
+            </a:r>
+          </a:p>
+          <a:p>
+            <a:pPr marL="628650" lvl="1" indent="-171450">
+              <a:buFont typeface="Arial" panose="020B0604020202020204" pitchFamily="34" charset="0"/>
+              <a:buChar char="•"/>
+            </a:pPr>
+            <a:r>
+              <a:rPr lang="en-US" sz="2000" b="0" i="0" dirty="0">
+                <a:solidFill>
+                  <a:srgbClr val="202124"/>
+                </a:solidFill>
+                <a:effectLst/>
+              </a:rPr>
+              <a:t>Have security for the data storage, minting of tokens, and transfer of tokens according to Ethereum blockchain standards. </a:t>
+            </a:r>
+          </a:p>
+          <a:p>
+            <a:pPr marL="628650" lvl="1" indent="-171450">
+              <a:buFont typeface="Arial" panose="020B0604020202020204" pitchFamily="34" charset="0"/>
+              <a:buChar char="•"/>
+            </a:pPr>
+            <a:r>
+              <a:rPr lang="en-US" sz="2000" b="0" i="0" dirty="0">
+                <a:solidFill>
+                  <a:srgbClr val="202124"/>
+                </a:solidFill>
+                <a:effectLst/>
+              </a:rPr>
+              <a:t>Function properly to allow game play and token transfers while being gas efficient. </a:t>
+            </a:r>
+          </a:p>
+          <a:p>
+            <a:pPr marL="628650" lvl="1" indent="-171450">
+              <a:buFont typeface="Arial" panose="020B0604020202020204" pitchFamily="34" charset="0"/>
+              <a:buChar char="•"/>
+            </a:pPr>
+            <a:r>
+              <a:rPr lang="en-US" sz="2000" dirty="0">
+                <a:solidFill>
+                  <a:srgbClr val="202124"/>
+                </a:solidFill>
+              </a:rPr>
+              <a:t>Work across the various technology platforms and networks.</a:t>
+            </a:r>
+            <a:endParaRPr lang="en-US" sz="2000" b="0" i="0" dirty="0">
+              <a:solidFill>
+                <a:srgbClr val="202124"/>
+              </a:solidFill>
+              <a:effectLst/>
+            </a:endParaRPr>
+          </a:p>
+        </p:txBody>
+      </p:sp>
       <p:grpSp>
         <p:nvGrpSpPr>
-          <p:cNvPr id="4" name="Group 3">
-            <a:extLst>
-              <a:ext uri="{FF2B5EF4-FFF2-40B4-BE49-F238E27FC236}">
-                <a16:creationId xmlns:a16="http://schemas.microsoft.com/office/drawing/2014/main" id="{DA452823-8805-6CA2-B24B-7CFD46842F39}"/>
+          <p:cNvPr id="5" name="Group 4">
+            <a:extLst>
+              <a:ext uri="{FF2B5EF4-FFF2-40B4-BE49-F238E27FC236}">
+                <a16:creationId xmlns:a16="http://schemas.microsoft.com/office/drawing/2014/main" id="{CAF7AE37-AC7B-591E-300F-E7326666C766}"/>
               </a:ext>
             </a:extLst>
           </p:cNvPr>
@@ -6654,10 +7017,10 @@
         </p:grpSpPr>
         <p:sp>
           <p:nvSpPr>
-            <p:cNvPr id="5" name="Rectangle 4">
+            <p:cNvPr id="6" name="Rectangle 5">
               <a:extLst>
                 <a:ext uri="{FF2B5EF4-FFF2-40B4-BE49-F238E27FC236}">
-                  <a16:creationId xmlns:a16="http://schemas.microsoft.com/office/drawing/2014/main" id="{98F38B91-67F6-78EB-AC88-AD7E690C8751}"/>
+                  <a16:creationId xmlns:a16="http://schemas.microsoft.com/office/drawing/2014/main" id="{7F93729D-D9D6-593F-D5A7-064FE28AC338}"/>
                 </a:ext>
               </a:extLst>
             </p:cNvPr>
@@ -6706,17 +7069,17 @@
                 <a:rPr lang="en-US" sz="2400" dirty="0">
                   <a:latin typeface="Copperplate Gothic Bold" panose="020E0705020206020404" pitchFamily="34" charset="0"/>
                 </a:rPr>
-                <a:t>Backend game setup</a:t>
+                <a:t>Acceptance criteria</a:t>
               </a:r>
             </a:p>
           </p:txBody>
         </p:sp>
         <p:pic>
           <p:nvPicPr>
-            <p:cNvPr id="6" name="Picture 5">
+            <p:cNvPr id="7" name="Picture 6">
               <a:extLst>
                 <a:ext uri="{FF2B5EF4-FFF2-40B4-BE49-F238E27FC236}">
-                  <a16:creationId xmlns:a16="http://schemas.microsoft.com/office/drawing/2014/main" id="{F7AEB80D-B5C2-F6CE-5BD3-54119AFDD1B9}"/>
+                  <a16:creationId xmlns:a16="http://schemas.microsoft.com/office/drawing/2014/main" id="{FB4957CF-C113-E6FC-EBA5-70A2C710B4CC}"/>
                 </a:ext>
               </a:extLst>
             </p:cNvPr>
@@ -6742,96 +7105,10 @@
           </p:spPr>
         </p:pic>
       </p:grpSp>
-      <p:sp>
-        <p:nvSpPr>
-          <p:cNvPr id="7" name="TextBox 6">
-            <a:extLst>
-              <a:ext uri="{FF2B5EF4-FFF2-40B4-BE49-F238E27FC236}">
-                <a16:creationId xmlns:a16="http://schemas.microsoft.com/office/drawing/2014/main" id="{077BDDE9-ADCB-AB0B-D817-F08752B35F48}"/>
-              </a:ext>
-            </a:extLst>
-          </p:cNvPr>
-          <p:cNvSpPr txBox="1"/>
-          <p:nvPr/>
-        </p:nvSpPr>
-        <p:spPr>
-          <a:xfrm>
-            <a:off x="549524" y="1792836"/>
-            <a:ext cx="2829401" cy="1569660"/>
-          </a:xfrm>
-          <a:prstGeom prst="rect">
-            <a:avLst/>
-          </a:prstGeom>
-          <a:noFill/>
-        </p:spPr>
-        <p:txBody>
-          <a:bodyPr wrap="square" rtlCol="0">
-            <a:spAutoFit/>
-          </a:bodyPr>
-          <a:lstStyle/>
-          <a:p>
-            <a:pPr algn="ctr"/>
-            <a:r>
-              <a:rPr lang="en-US" sz="2400" b="1" dirty="0"/>
-              <a:t>Etherscan</a:t>
-            </a:r>
-          </a:p>
-          <a:p>
-            <a:pPr algn="ctr"/>
-            <a:endParaRPr lang="en-US" dirty="0"/>
-          </a:p>
-          <a:p>
-            <a:pPr algn="ctr"/>
-            <a:r>
-              <a:rPr lang="en-US" dirty="0"/>
-              <a:t>Proof of transaction on Rinkeby Testnet Network</a:t>
-            </a:r>
-          </a:p>
-          <a:p>
-            <a:pPr algn="ctr"/>
-            <a:endParaRPr lang="en-US" dirty="0"/>
-          </a:p>
-        </p:txBody>
-      </p:sp>
-      <p:pic>
-        <p:nvPicPr>
-          <p:cNvPr id="2" name="Picture 1">
-            <a:extLst>
-              <a:ext uri="{FF2B5EF4-FFF2-40B4-BE49-F238E27FC236}">
-                <a16:creationId xmlns:a16="http://schemas.microsoft.com/office/drawing/2014/main" id="{D6C66D85-8052-C0C6-E9A0-3F4C93A4B66D}"/>
-              </a:ext>
-            </a:extLst>
-          </p:cNvPr>
-          <p:cNvPicPr>
-            <a:picLocks noChangeAspect="1"/>
-          </p:cNvPicPr>
-          <p:nvPr/>
-        </p:nvPicPr>
-        <p:blipFill>
-          <a:blip r:embed="rId3"/>
-          <a:stretch>
-            <a:fillRect/>
-          </a:stretch>
-        </p:blipFill>
-        <p:spPr>
-          <a:xfrm>
-            <a:off x="5034876" y="1416131"/>
-            <a:ext cx="6825314" cy="5289470"/>
-          </a:xfrm>
-          <a:prstGeom prst="rect">
-            <a:avLst/>
-          </a:prstGeom>
-          <a:ln>
-            <a:solidFill>
-              <a:schemeClr val="tx1"/>
-            </a:solidFill>
-          </a:ln>
-        </p:spPr>
-      </p:pic>
     </p:spTree>
     <p:extLst>
       <p:ext uri="{BB962C8B-B14F-4D97-AF65-F5344CB8AC3E}">
-        <p14:creationId xmlns:p14="http://schemas.microsoft.com/office/powerpoint/2010/main" val="3145065351"/>
+        <p14:creationId xmlns:p14="http://schemas.microsoft.com/office/powerpoint/2010/main" val="1181379338"/>
       </p:ext>
     </p:extLst>
   </p:cSld>
@@ -7394,6 +7671,71 @@
             <a:r>
               <a:rPr lang="en-US" dirty="0"/>
               <a:t>Etherscan Rinkeby Testnet Explorer for test network</a:t>
+            </a:r>
+          </a:p>
+        </p:txBody>
+      </p:sp>
+      <p:pic>
+        <p:nvPicPr>
+          <p:cNvPr id="12" name="Picture 11">
+            <a:extLst>
+              <a:ext uri="{FF2B5EF4-FFF2-40B4-BE49-F238E27FC236}">
+                <a16:creationId xmlns:a16="http://schemas.microsoft.com/office/drawing/2014/main" id="{B1DB86FF-51F2-FCC9-7D6F-0EBEDB2BCFFC}"/>
+              </a:ext>
+            </a:extLst>
+          </p:cNvPr>
+          <p:cNvPicPr>
+            <a:picLocks noChangeAspect="1"/>
+          </p:cNvPicPr>
+          <p:nvPr/>
+        </p:nvPicPr>
+        <p:blipFill>
+          <a:blip r:embed="rId9"/>
+          <a:stretch>
+            <a:fillRect/>
+          </a:stretch>
+        </p:blipFill>
+        <p:spPr>
+          <a:xfrm>
+            <a:off x="7481001" y="4731126"/>
+            <a:ext cx="654084" cy="596931"/>
+          </a:xfrm>
+          <a:prstGeom prst="rect">
+            <a:avLst/>
+          </a:prstGeom>
+        </p:spPr>
+      </p:pic>
+      <p:sp>
+        <p:nvSpPr>
+          <p:cNvPr id="22" name="TextBox 21">
+            <a:extLst>
+              <a:ext uri="{FF2B5EF4-FFF2-40B4-BE49-F238E27FC236}">
+                <a16:creationId xmlns:a16="http://schemas.microsoft.com/office/drawing/2014/main" id="{7C76C52F-A40E-4A6B-4AD4-15154BCD6A64}"/>
+              </a:ext>
+            </a:extLst>
+          </p:cNvPr>
+          <p:cNvSpPr txBox="1"/>
+          <p:nvPr/>
+        </p:nvSpPr>
+        <p:spPr>
+          <a:xfrm>
+            <a:off x="8450636" y="4844925"/>
+            <a:ext cx="2739808" cy="369332"/>
+          </a:xfrm>
+          <a:prstGeom prst="rect">
+            <a:avLst/>
+          </a:prstGeom>
+          <a:noFill/>
+        </p:spPr>
+        <p:txBody>
+          <a:bodyPr wrap="square" rtlCol="0">
+            <a:spAutoFit/>
+          </a:bodyPr>
+          <a:lstStyle/>
+          <a:p>
+            <a:r>
+              <a:rPr lang="en-US" dirty="0"/>
+              <a:t>Adobe Illustrator</a:t>
             </a:r>
           </a:p>
         </p:txBody>
@@ -9685,38 +10027,8 @@
         </p:blipFill>
         <p:spPr>
           <a:xfrm>
-            <a:off x="-1549161" y="874198"/>
-            <a:ext cx="6765594" cy="3805646"/>
-          </a:xfrm>
-          <a:prstGeom prst="rect">
-            <a:avLst/>
-          </a:prstGeom>
-        </p:spPr>
-      </p:pic>
-      <p:pic>
-        <p:nvPicPr>
-          <p:cNvPr id="7" name="Picture 6">
-            <a:extLst>
-              <a:ext uri="{FF2B5EF4-FFF2-40B4-BE49-F238E27FC236}">
-                <a16:creationId xmlns:a16="http://schemas.microsoft.com/office/drawing/2014/main" id="{A70BDF94-93BA-9A72-DC74-2632E91B9ADA}"/>
-              </a:ext>
-            </a:extLst>
-          </p:cNvPr>
-          <p:cNvPicPr>
-            <a:picLocks noChangeAspect="1"/>
-          </p:cNvPicPr>
-          <p:nvPr/>
-        </p:nvPicPr>
-        <p:blipFill>
-          <a:blip r:embed="rId4"/>
-          <a:stretch>
-            <a:fillRect/>
-          </a:stretch>
-        </p:blipFill>
-        <p:spPr>
-          <a:xfrm>
-            <a:off x="8251459" y="4648874"/>
-            <a:ext cx="3523147" cy="1979296"/>
+            <a:off x="3881717" y="1232785"/>
+            <a:ext cx="9295374" cy="5228647"/>
           </a:xfrm>
           <a:prstGeom prst="rect">
             <a:avLst/>
@@ -9737,7 +10049,7 @@
         </p:nvSpPr>
         <p:spPr>
           <a:xfrm>
-            <a:off x="4659085" y="2658035"/>
+            <a:off x="2283437" y="2364485"/>
             <a:ext cx="2873829" cy="2308324"/>
           </a:xfrm>
           <a:prstGeom prst="rect">
@@ -9773,738 +10085,6 @@
 </file>
 
 <file path=ppt/slides/slide6.xml><?xml version="1.0" encoding="utf-8"?>
-<p:sld xmlns:a="http://schemas.openxmlformats.org/drawingml/2006/main" xmlns:r="http://schemas.openxmlformats.org/officeDocument/2006/relationships" xmlns:p="http://schemas.openxmlformats.org/presentationml/2006/main">
-  <p:cSld>
-    <p:spTree>
-      <p:nvGrpSpPr>
-        <p:cNvPr id="1" name=""/>
-        <p:cNvGrpSpPr/>
-        <p:nvPr/>
-      </p:nvGrpSpPr>
-      <p:grpSpPr>
-        <a:xfrm>
-          <a:off x="0" y="0"/>
-          <a:ext cx="0" cy="0"/>
-          <a:chOff x="0" y="0"/>
-          <a:chExt cx="0" cy="0"/>
-        </a:xfrm>
-      </p:grpSpPr>
-      <p:sp>
-        <p:nvSpPr>
-          <p:cNvPr id="3" name="TextBox 2">
-            <a:extLst>
-              <a:ext uri="{FF2B5EF4-FFF2-40B4-BE49-F238E27FC236}">
-                <a16:creationId xmlns:a16="http://schemas.microsoft.com/office/drawing/2014/main" id="{34CE54B5-7E96-75C6-C8F4-45E78D224FCF}"/>
-              </a:ext>
-            </a:extLst>
-          </p:cNvPr>
-          <p:cNvSpPr txBox="1"/>
-          <p:nvPr/>
-        </p:nvSpPr>
-        <p:spPr>
-          <a:xfrm>
-            <a:off x="838954" y="1471136"/>
-            <a:ext cx="10800932" cy="4524315"/>
-          </a:xfrm>
-          <a:prstGeom prst="rect">
-            <a:avLst/>
-          </a:prstGeom>
-          <a:noFill/>
-        </p:spPr>
-        <p:txBody>
-          <a:bodyPr wrap="square" rtlCol="0">
-            <a:spAutoFit/>
-          </a:bodyPr>
-          <a:lstStyle/>
-          <a:p>
-            <a:pPr marL="628650" lvl="1" indent="-171450">
-              <a:buFont typeface="Arial" panose="020B0604020202020204" pitchFamily="34" charset="0"/>
-              <a:buChar char="•"/>
-            </a:pPr>
-            <a:r>
-              <a:rPr lang="en-US" sz="1600" b="0" i="0" dirty="0">
-                <a:solidFill>
-                  <a:srgbClr val="202124"/>
-                </a:solidFill>
-                <a:effectLst/>
-              </a:rPr>
-              <a:t>As a gamer, I want to:</a:t>
-            </a:r>
-          </a:p>
-          <a:p>
-            <a:pPr marL="1085850" lvl="2" indent="-171450">
-              <a:buFont typeface="Arial" panose="020B0604020202020204" pitchFamily="34" charset="0"/>
-              <a:buChar char="•"/>
-            </a:pPr>
-            <a:r>
-              <a:rPr lang="en-US" sz="1600" dirty="0">
-                <a:solidFill>
-                  <a:srgbClr val="202124"/>
-                </a:solidFill>
-              </a:rPr>
-              <a:t>H</a:t>
-            </a:r>
-            <a:r>
-              <a:rPr lang="en-US" sz="1600" b="0" i="0" dirty="0">
-                <a:solidFill>
-                  <a:srgbClr val="202124"/>
-                </a:solidFill>
-                <a:effectLst/>
-              </a:rPr>
-              <a:t>ave fun while having the chance to earn tokens so I feel that my time is well spent. </a:t>
-            </a:r>
-          </a:p>
-          <a:p>
-            <a:pPr marL="1085850" lvl="2" indent="-171450">
-              <a:buFont typeface="Arial" panose="020B0604020202020204" pitchFamily="34" charset="0"/>
-              <a:buChar char="•"/>
-            </a:pPr>
-            <a:r>
-              <a:rPr lang="en-US" sz="1600" dirty="0">
-                <a:solidFill>
-                  <a:srgbClr val="202124"/>
-                </a:solidFill>
-              </a:rPr>
-              <a:t>B</a:t>
-            </a:r>
-            <a:r>
-              <a:rPr lang="en-US" sz="1600" b="0" i="0" dirty="0">
-                <a:solidFill>
-                  <a:srgbClr val="202124"/>
-                </a:solidFill>
-                <a:effectLst/>
-              </a:rPr>
-              <a:t>e able to create a character as an NFT so that I have the possibility of re-selling the NFT in the future. </a:t>
-            </a:r>
-          </a:p>
-          <a:p>
-            <a:pPr marL="1085850" lvl="2" indent="-171450">
-              <a:buFont typeface="Arial" panose="020B0604020202020204" pitchFamily="34" charset="0"/>
-              <a:buChar char="•"/>
-            </a:pPr>
-            <a:r>
-              <a:rPr lang="en-US" sz="1600" dirty="0">
-                <a:solidFill>
-                  <a:srgbClr val="202124"/>
-                </a:solidFill>
-              </a:rPr>
-              <a:t>Know t</a:t>
-            </a:r>
-            <a:r>
-              <a:rPr lang="en-US" sz="1600" b="0" i="0" dirty="0">
-                <a:solidFill>
-                  <a:srgbClr val="202124"/>
-                </a:solidFill>
-                <a:effectLst/>
-              </a:rPr>
-              <a:t>he game to be set up in a transparent way so that I can compete and trust the result, win or lose. </a:t>
-            </a:r>
-          </a:p>
-          <a:p>
-            <a:pPr marL="1085850" lvl="2" indent="-171450">
-              <a:buFont typeface="Arial" panose="020B0604020202020204" pitchFamily="34" charset="0"/>
-              <a:buChar char="•"/>
-            </a:pPr>
-            <a:r>
-              <a:rPr lang="en-US" sz="1600" dirty="0">
-                <a:solidFill>
-                  <a:srgbClr val="202124"/>
-                </a:solidFill>
-              </a:rPr>
-              <a:t>E</a:t>
-            </a:r>
-            <a:r>
-              <a:rPr lang="en-US" sz="1600" b="0" i="0" dirty="0">
-                <a:solidFill>
-                  <a:srgbClr val="202124"/>
-                </a:solidFill>
-                <a:effectLst/>
-              </a:rPr>
-              <a:t>nsure that the transfer of tokens is secure so that I do not lose value. </a:t>
-            </a:r>
-          </a:p>
-          <a:p>
-            <a:pPr marL="628650" lvl="1" indent="-171450">
-              <a:buFont typeface="Arial" panose="020B0604020202020204" pitchFamily="34" charset="0"/>
-              <a:buChar char="•"/>
-            </a:pPr>
-            <a:endParaRPr lang="en-US" sz="1600" dirty="0">
-              <a:solidFill>
-                <a:srgbClr val="202124"/>
-              </a:solidFill>
-            </a:endParaRPr>
-          </a:p>
-          <a:p>
-            <a:pPr marL="628650" lvl="1" indent="-171450">
-              <a:buFont typeface="Arial" panose="020B0604020202020204" pitchFamily="34" charset="0"/>
-              <a:buChar char="•"/>
-            </a:pPr>
-            <a:r>
-              <a:rPr lang="en-US" sz="1600" b="0" i="0" dirty="0">
-                <a:solidFill>
-                  <a:srgbClr val="202124"/>
-                </a:solidFill>
-                <a:effectLst/>
-              </a:rPr>
-              <a:t>As a game administrator, I want to:</a:t>
-            </a:r>
-          </a:p>
-          <a:p>
-            <a:pPr marL="1085850" lvl="2" indent="-171450">
-              <a:buFont typeface="Arial" panose="020B0604020202020204" pitchFamily="34" charset="0"/>
-              <a:buChar char="•"/>
-            </a:pPr>
-            <a:r>
-              <a:rPr lang="en-US" sz="1600" dirty="0">
-                <a:solidFill>
-                  <a:srgbClr val="202124"/>
-                </a:solidFill>
-              </a:rPr>
-              <a:t>E</a:t>
-            </a:r>
-            <a:r>
-              <a:rPr lang="en-US" sz="1600" b="0" i="0" dirty="0">
-                <a:solidFill>
-                  <a:srgbClr val="202124"/>
-                </a:solidFill>
-                <a:effectLst/>
-              </a:rPr>
-              <a:t>nsure that the treasury component of the blockchain is accurately accounting for token transfers so that no tokens are misdirected. </a:t>
-            </a:r>
-          </a:p>
-          <a:p>
-            <a:pPr marL="1085850" lvl="2" indent="-171450">
-              <a:buFont typeface="Arial" panose="020B0604020202020204" pitchFamily="34" charset="0"/>
-              <a:buChar char="•"/>
-            </a:pPr>
-            <a:r>
-              <a:rPr lang="en-US" sz="1600" dirty="0">
-                <a:solidFill>
-                  <a:srgbClr val="202124"/>
-                </a:solidFill>
-              </a:rPr>
-              <a:t>M</a:t>
-            </a:r>
-            <a:r>
-              <a:rPr lang="en-US" sz="1600" b="0" i="0" dirty="0">
-                <a:solidFill>
-                  <a:srgbClr val="202124"/>
-                </a:solidFill>
-                <a:effectLst/>
-              </a:rPr>
-              <a:t>ake sure that the game code is secure so that no unauthorized people can mint new tokens or steal tokens.</a:t>
-            </a:r>
-          </a:p>
-          <a:p>
-            <a:pPr marL="628650" lvl="1" indent="-171450">
-              <a:buFont typeface="Arial" panose="020B0604020202020204" pitchFamily="34" charset="0"/>
-              <a:buChar char="•"/>
-            </a:pPr>
-            <a:endParaRPr lang="en-US" sz="1600" dirty="0">
-              <a:solidFill>
-                <a:srgbClr val="202124"/>
-              </a:solidFill>
-            </a:endParaRPr>
-          </a:p>
-          <a:p>
-            <a:pPr marL="628650" lvl="1" indent="-171450">
-              <a:buFont typeface="Arial" panose="020B0604020202020204" pitchFamily="34" charset="0"/>
-              <a:buChar char="•"/>
-            </a:pPr>
-            <a:r>
-              <a:rPr lang="en-US" sz="1600" b="0" i="0" dirty="0">
-                <a:solidFill>
-                  <a:srgbClr val="202124"/>
-                </a:solidFill>
-                <a:effectLst/>
-              </a:rPr>
-              <a:t>As a game designer, I want to:</a:t>
-            </a:r>
-          </a:p>
-          <a:p>
-            <a:pPr marL="1085850" lvl="2" indent="-171450">
-              <a:buFont typeface="Arial" panose="020B0604020202020204" pitchFamily="34" charset="0"/>
-              <a:buChar char="•"/>
-            </a:pPr>
-            <a:r>
-              <a:rPr lang="en-US" sz="1600" dirty="0">
-                <a:solidFill>
-                  <a:srgbClr val="202124"/>
-                </a:solidFill>
-              </a:rPr>
-              <a:t>E</a:t>
-            </a:r>
-            <a:r>
-              <a:rPr lang="en-US" sz="1600" b="0" i="0" dirty="0">
-                <a:solidFill>
-                  <a:srgbClr val="202124"/>
-                </a:solidFill>
-                <a:effectLst/>
-              </a:rPr>
-              <a:t>nsure that all of the technology works together to create a seamless and easy experience for gamers.</a:t>
-            </a:r>
-          </a:p>
-          <a:p>
-            <a:pPr marL="1085850" lvl="2" indent="-171450">
-              <a:buFont typeface="Arial" panose="020B0604020202020204" pitchFamily="34" charset="0"/>
-              <a:buChar char="•"/>
-            </a:pPr>
-            <a:r>
-              <a:rPr lang="en-US" sz="1600" b="0" i="0" dirty="0">
-                <a:solidFill>
-                  <a:srgbClr val="202124"/>
-                </a:solidFill>
-                <a:effectLst/>
-              </a:rPr>
-              <a:t>Create a game that is fun to play and encourages gamers to return.</a:t>
-            </a:r>
-          </a:p>
-          <a:p>
-            <a:pPr marL="1085850" lvl="2" indent="-171450">
-              <a:buFont typeface="Arial" panose="020B0604020202020204" pitchFamily="34" charset="0"/>
-              <a:buChar char="•"/>
-            </a:pPr>
-            <a:r>
-              <a:rPr lang="en-US" sz="1600" b="0" i="0" dirty="0">
-                <a:solidFill>
-                  <a:srgbClr val="202124"/>
-                </a:solidFill>
-                <a:effectLst/>
-              </a:rPr>
-              <a:t>Provide a visually stunning and fun set of graphics in the game interface and character NFTs that create a unique look and brand for the game.</a:t>
-            </a:r>
-          </a:p>
-          <a:p>
-            <a:pPr marL="1085850" lvl="2" indent="-171450">
-              <a:buFont typeface="Arial" panose="020B0604020202020204" pitchFamily="34" charset="0"/>
-              <a:buChar char="•"/>
-            </a:pPr>
-            <a:r>
-              <a:rPr lang="en-US" sz="1600" b="0" i="0" dirty="0">
-                <a:solidFill>
-                  <a:srgbClr val="202124"/>
-                </a:solidFill>
-                <a:effectLst/>
-              </a:rPr>
-              <a:t>Charge a fee to make a profit from owning and running the game.</a:t>
-            </a:r>
-          </a:p>
-          <a:p>
-            <a:pPr marL="1085850" lvl="2" indent="-171450">
-              <a:buFont typeface="Arial" panose="020B0604020202020204" pitchFamily="34" charset="0"/>
-              <a:buChar char="•"/>
-            </a:pPr>
-            <a:r>
-              <a:rPr lang="en-US" sz="1600" b="0" i="0" dirty="0">
-                <a:solidFill>
-                  <a:srgbClr val="202124"/>
-                </a:solidFill>
-                <a:effectLst/>
-              </a:rPr>
-              <a:t>Market the game and create a strong community of passionate users who continue to play the game over time.</a:t>
-            </a:r>
-          </a:p>
-        </p:txBody>
-      </p:sp>
-      <p:grpSp>
-        <p:nvGrpSpPr>
-          <p:cNvPr id="4" name="Group 3">
-            <a:extLst>
-              <a:ext uri="{FF2B5EF4-FFF2-40B4-BE49-F238E27FC236}">
-                <a16:creationId xmlns:a16="http://schemas.microsoft.com/office/drawing/2014/main" id="{47479E60-6B1A-7A4E-398B-3AC8A39B3B4D}"/>
-              </a:ext>
-            </a:extLst>
-          </p:cNvPr>
-          <p:cNvGrpSpPr/>
-          <p:nvPr/>
-        </p:nvGrpSpPr>
-        <p:grpSpPr>
-          <a:xfrm>
-            <a:off x="0" y="0"/>
-            <a:ext cx="12192000" cy="1062869"/>
-            <a:chOff x="0" y="1062868"/>
-            <a:chExt cx="12192000" cy="1062869"/>
-          </a:xfrm>
-        </p:grpSpPr>
-        <p:sp>
-          <p:nvSpPr>
-            <p:cNvPr id="5" name="Rectangle 4">
-              <a:extLst>
-                <a:ext uri="{FF2B5EF4-FFF2-40B4-BE49-F238E27FC236}">
-                  <a16:creationId xmlns:a16="http://schemas.microsoft.com/office/drawing/2014/main" id="{7D985D39-CAFE-2A5D-F9C3-973057171CFC}"/>
-                </a:ext>
-              </a:extLst>
-            </p:cNvPr>
-            <p:cNvSpPr/>
-            <p:nvPr/>
-          </p:nvSpPr>
-          <p:spPr>
-            <a:xfrm>
-              <a:off x="0" y="1062868"/>
-              <a:ext cx="12192000" cy="1062869"/>
-            </a:xfrm>
-            <a:prstGeom prst="rect">
-              <a:avLst/>
-            </a:prstGeom>
-            <a:solidFill>
-              <a:schemeClr val="tx1"/>
-            </a:solidFill>
-            <a:ln>
-              <a:solidFill>
-                <a:schemeClr val="tx1"/>
-              </a:solidFill>
-            </a:ln>
-          </p:spPr>
-          <p:style>
-            <a:lnRef idx="2">
-              <a:schemeClr val="accent1">
-                <a:shade val="50000"/>
-              </a:schemeClr>
-            </a:lnRef>
-            <a:fillRef idx="1">
-              <a:schemeClr val="accent1"/>
-            </a:fillRef>
-            <a:effectRef idx="0">
-              <a:schemeClr val="accent1"/>
-            </a:effectRef>
-            <a:fontRef idx="minor">
-              <a:schemeClr val="lt1"/>
-            </a:fontRef>
-          </p:style>
-          <p:txBody>
-            <a:bodyPr rtlCol="0" anchor="ctr"/>
-            <a:lstStyle/>
-            <a:p>
-              <a:pPr algn="ctr"/>
-              <a:r>
-                <a:rPr lang="en-US" sz="2400" dirty="0">
-                  <a:latin typeface="Copperplate Gothic Bold" panose="020E0705020206020404" pitchFamily="34" charset="0"/>
-                </a:rPr>
-                <a:t>user stories</a:t>
-              </a:r>
-            </a:p>
-          </p:txBody>
-        </p:sp>
-        <p:pic>
-          <p:nvPicPr>
-            <p:cNvPr id="6" name="Picture 5">
-              <a:extLst>
-                <a:ext uri="{FF2B5EF4-FFF2-40B4-BE49-F238E27FC236}">
-                  <a16:creationId xmlns:a16="http://schemas.microsoft.com/office/drawing/2014/main" id="{193E25A5-0359-C35C-7F20-FA998A2DADEE}"/>
-                </a:ext>
-              </a:extLst>
-            </p:cNvPr>
-            <p:cNvPicPr>
-              <a:picLocks noChangeAspect="1"/>
-            </p:cNvPicPr>
-            <p:nvPr/>
-          </p:nvPicPr>
-          <p:blipFill>
-            <a:blip r:embed="rId2"/>
-            <a:stretch>
-              <a:fillRect/>
-            </a:stretch>
-          </p:blipFill>
-          <p:spPr>
-            <a:xfrm>
-              <a:off x="200025" y="1062868"/>
-              <a:ext cx="1419043" cy="1062869"/>
-            </a:xfrm>
-            <a:prstGeom prst="rect">
-              <a:avLst/>
-            </a:prstGeom>
-          </p:spPr>
-        </p:pic>
-      </p:grpSp>
-    </p:spTree>
-    <p:extLst>
-      <p:ext uri="{BB962C8B-B14F-4D97-AF65-F5344CB8AC3E}">
-        <p14:creationId xmlns:p14="http://schemas.microsoft.com/office/powerpoint/2010/main" val="1990386000"/>
-      </p:ext>
-    </p:extLst>
-  </p:cSld>
-  <p:clrMapOvr>
-    <a:masterClrMapping/>
-  </p:clrMapOvr>
-</p:sld>
-</file>
-
-<file path=ppt/slides/slide7.xml><?xml version="1.0" encoding="utf-8"?>
-<p:sld xmlns:a="http://schemas.openxmlformats.org/drawingml/2006/main" xmlns:r="http://schemas.openxmlformats.org/officeDocument/2006/relationships" xmlns:p="http://schemas.openxmlformats.org/presentationml/2006/main">
-  <p:cSld>
-    <p:spTree>
-      <p:nvGrpSpPr>
-        <p:cNvPr id="1" name=""/>
-        <p:cNvGrpSpPr/>
-        <p:nvPr/>
-      </p:nvGrpSpPr>
-      <p:grpSpPr>
-        <a:xfrm>
-          <a:off x="0" y="0"/>
-          <a:ext cx="0" cy="0"/>
-          <a:chOff x="0" y="0"/>
-          <a:chExt cx="0" cy="0"/>
-        </a:xfrm>
-      </p:grpSpPr>
-      <p:sp>
-        <p:nvSpPr>
-          <p:cNvPr id="2" name="TextBox 1">
-            <a:extLst>
-              <a:ext uri="{FF2B5EF4-FFF2-40B4-BE49-F238E27FC236}">
-                <a16:creationId xmlns:a16="http://schemas.microsoft.com/office/drawing/2014/main" id="{8C46D993-3F88-8E35-298C-E59D82DE74D4}"/>
-              </a:ext>
-            </a:extLst>
-          </p:cNvPr>
-          <p:cNvSpPr txBox="1"/>
-          <p:nvPr/>
-        </p:nvSpPr>
-        <p:spPr>
-          <a:xfrm>
-            <a:off x="970506" y="1992509"/>
-            <a:ext cx="9773320" cy="3231654"/>
-          </a:xfrm>
-          <a:prstGeom prst="rect">
-            <a:avLst/>
-          </a:prstGeom>
-          <a:noFill/>
-        </p:spPr>
-        <p:txBody>
-          <a:bodyPr wrap="square" rtlCol="0">
-            <a:spAutoFit/>
-          </a:bodyPr>
-          <a:lstStyle/>
-          <a:p>
-            <a:r>
-              <a:rPr lang="en-US" sz="2400" b="0" i="0" dirty="0">
-                <a:solidFill>
-                  <a:srgbClr val="202124"/>
-                </a:solidFill>
-                <a:effectLst/>
-              </a:rPr>
-              <a:t>The game must:</a:t>
-            </a:r>
-          </a:p>
-          <a:p>
-            <a:pPr marL="628650" lvl="1" indent="-171450">
-              <a:buFont typeface="Arial" panose="020B0604020202020204" pitchFamily="34" charset="0"/>
-              <a:buChar char="•"/>
-            </a:pPr>
-            <a:r>
-              <a:rPr lang="en-US" sz="2000" b="0" i="0" dirty="0">
-                <a:solidFill>
-                  <a:srgbClr val="202124"/>
-                </a:solidFill>
-                <a:effectLst/>
-              </a:rPr>
-              <a:t>Have an enticing story, theme, and user interface in order to attract players. </a:t>
-            </a:r>
-          </a:p>
-          <a:p>
-            <a:pPr marL="628650" lvl="1" indent="-171450">
-              <a:buFont typeface="Arial" panose="020B0604020202020204" pitchFamily="34" charset="0"/>
-              <a:buChar char="•"/>
-            </a:pPr>
-            <a:r>
-              <a:rPr lang="en-US" sz="2000" b="0" i="0" dirty="0">
-                <a:solidFill>
-                  <a:srgbClr val="202124"/>
-                </a:solidFill>
-                <a:effectLst/>
-              </a:rPr>
-              <a:t>Provide gameplay that offers reasonable challenge and rewards in order to keep players coming back. </a:t>
-            </a:r>
-          </a:p>
-          <a:p>
-            <a:pPr marL="628650" lvl="1" indent="-171450">
-              <a:buFont typeface="Arial" panose="020B0604020202020204" pitchFamily="34" charset="0"/>
-              <a:buChar char="•"/>
-            </a:pPr>
-            <a:r>
-              <a:rPr lang="en-US" sz="2000" b="0" i="0" dirty="0">
-                <a:solidFill>
-                  <a:srgbClr val="202124"/>
-                </a:solidFill>
-                <a:effectLst/>
-              </a:rPr>
-              <a:t>Produce a token and NFTs that are designed with appropriate standards so that they could be publicly traded in a future release. </a:t>
-            </a:r>
-          </a:p>
-          <a:p>
-            <a:pPr marL="628650" lvl="1" indent="-171450">
-              <a:buFont typeface="Arial" panose="020B0604020202020204" pitchFamily="34" charset="0"/>
-              <a:buChar char="•"/>
-            </a:pPr>
-            <a:r>
-              <a:rPr lang="en-US" sz="2000" b="0" i="0" dirty="0">
-                <a:solidFill>
-                  <a:srgbClr val="202124"/>
-                </a:solidFill>
-                <a:effectLst/>
-              </a:rPr>
-              <a:t>Have security for the data storage, minting of tokens, and transfer of tokens according to Ethereum blockchain standards. </a:t>
-            </a:r>
-          </a:p>
-          <a:p>
-            <a:pPr marL="628650" lvl="1" indent="-171450">
-              <a:buFont typeface="Arial" panose="020B0604020202020204" pitchFamily="34" charset="0"/>
-              <a:buChar char="•"/>
-            </a:pPr>
-            <a:r>
-              <a:rPr lang="en-US" sz="2000" b="0" i="0" dirty="0">
-                <a:solidFill>
-                  <a:srgbClr val="202124"/>
-                </a:solidFill>
-                <a:effectLst/>
-              </a:rPr>
-              <a:t>Function properly to allow game play and token transfers while being gas efficient. </a:t>
-            </a:r>
-          </a:p>
-          <a:p>
-            <a:pPr marL="628650" lvl="1" indent="-171450">
-              <a:buFont typeface="Arial" panose="020B0604020202020204" pitchFamily="34" charset="0"/>
-              <a:buChar char="•"/>
-            </a:pPr>
-            <a:r>
-              <a:rPr lang="en-US" sz="2000" dirty="0">
-                <a:solidFill>
-                  <a:srgbClr val="202124"/>
-                </a:solidFill>
-              </a:rPr>
-              <a:t>Work across the various technology platforms and networks.</a:t>
-            </a:r>
-            <a:endParaRPr lang="en-US" sz="2000" b="0" i="0" dirty="0">
-              <a:solidFill>
-                <a:srgbClr val="202124"/>
-              </a:solidFill>
-              <a:effectLst/>
-            </a:endParaRPr>
-          </a:p>
-        </p:txBody>
-      </p:sp>
-      <p:grpSp>
-        <p:nvGrpSpPr>
-          <p:cNvPr id="5" name="Group 4">
-            <a:extLst>
-              <a:ext uri="{FF2B5EF4-FFF2-40B4-BE49-F238E27FC236}">
-                <a16:creationId xmlns:a16="http://schemas.microsoft.com/office/drawing/2014/main" id="{CAF7AE37-AC7B-591E-300F-E7326666C766}"/>
-              </a:ext>
-            </a:extLst>
-          </p:cNvPr>
-          <p:cNvGrpSpPr/>
-          <p:nvPr/>
-        </p:nvGrpSpPr>
-        <p:grpSpPr>
-          <a:xfrm>
-            <a:off x="0" y="0"/>
-            <a:ext cx="12192000" cy="1062869"/>
-            <a:chOff x="0" y="1062868"/>
-            <a:chExt cx="12192000" cy="1062869"/>
-          </a:xfrm>
-        </p:grpSpPr>
-        <p:sp>
-          <p:nvSpPr>
-            <p:cNvPr id="6" name="Rectangle 5">
-              <a:extLst>
-                <a:ext uri="{FF2B5EF4-FFF2-40B4-BE49-F238E27FC236}">
-                  <a16:creationId xmlns:a16="http://schemas.microsoft.com/office/drawing/2014/main" id="{7F93729D-D9D6-593F-D5A7-064FE28AC338}"/>
-                </a:ext>
-              </a:extLst>
-            </p:cNvPr>
-            <p:cNvSpPr/>
-            <p:nvPr/>
-          </p:nvSpPr>
-          <p:spPr>
-            <a:xfrm>
-              <a:off x="0" y="1062868"/>
-              <a:ext cx="12192000" cy="1062869"/>
-            </a:xfrm>
-            <a:prstGeom prst="rect">
-              <a:avLst/>
-            </a:prstGeom>
-            <a:solidFill>
-              <a:schemeClr val="tx1"/>
-            </a:solidFill>
-            <a:ln>
-              <a:solidFill>
-                <a:schemeClr val="tx1"/>
-              </a:solidFill>
-            </a:ln>
-          </p:spPr>
-          <p:style>
-            <a:lnRef idx="2">
-              <a:schemeClr val="accent1">
-                <a:shade val="50000"/>
-              </a:schemeClr>
-            </a:lnRef>
-            <a:fillRef idx="1">
-              <a:schemeClr val="accent1"/>
-            </a:fillRef>
-            <a:effectRef idx="0">
-              <a:schemeClr val="accent1"/>
-            </a:effectRef>
-            <a:fontRef idx="minor">
-              <a:schemeClr val="lt1"/>
-            </a:fontRef>
-          </p:style>
-          <p:txBody>
-            <a:bodyPr rtlCol="0" anchor="ctr"/>
-            <a:lstStyle/>
-            <a:p>
-              <a:pPr algn="ctr"/>
-              <a:r>
-                <a:rPr lang="en-US" sz="2400" dirty="0">
-                  <a:latin typeface="Copperplate Gothic Bold" panose="020E0705020206020404" pitchFamily="34" charset="0"/>
-                </a:rPr>
-                <a:t>Acceptance criteria</a:t>
-              </a:r>
-            </a:p>
-          </p:txBody>
-        </p:sp>
-        <p:pic>
-          <p:nvPicPr>
-            <p:cNvPr id="7" name="Picture 6">
-              <a:extLst>
-                <a:ext uri="{FF2B5EF4-FFF2-40B4-BE49-F238E27FC236}">
-                  <a16:creationId xmlns:a16="http://schemas.microsoft.com/office/drawing/2014/main" id="{FB4957CF-C113-E6FC-EBA5-70A2C710B4CC}"/>
-                </a:ext>
-              </a:extLst>
-            </p:cNvPr>
-            <p:cNvPicPr>
-              <a:picLocks noChangeAspect="1"/>
-            </p:cNvPicPr>
-            <p:nvPr/>
-          </p:nvPicPr>
-          <p:blipFill>
-            <a:blip r:embed="rId2"/>
-            <a:stretch>
-              <a:fillRect/>
-            </a:stretch>
-          </p:blipFill>
-          <p:spPr>
-            <a:xfrm>
-              <a:off x="200025" y="1062868"/>
-              <a:ext cx="1419043" cy="1062869"/>
-            </a:xfrm>
-            <a:prstGeom prst="rect">
-              <a:avLst/>
-            </a:prstGeom>
-          </p:spPr>
-        </p:pic>
-      </p:grpSp>
-    </p:spTree>
-    <p:extLst>
-      <p:ext uri="{BB962C8B-B14F-4D97-AF65-F5344CB8AC3E}">
-        <p14:creationId xmlns:p14="http://schemas.microsoft.com/office/powerpoint/2010/main" val="1181379338"/>
-      </p:ext>
-    </p:extLst>
-  </p:cSld>
-  <p:clrMapOvr>
-    <a:masterClrMapping/>
-  </p:clrMapOvr>
-</p:sld>
-</file>
-
-<file path=ppt/slides/slide8.xml><?xml version="1.0" encoding="utf-8"?>
 <p:sld xmlns:a="http://schemas.openxmlformats.org/drawingml/2006/main" xmlns:r="http://schemas.openxmlformats.org/officeDocument/2006/relationships" xmlns:p="http://schemas.openxmlformats.org/presentationml/2006/main">
   <p:cSld>
     <p:spTree>
@@ -10740,7 +10320,7 @@
 </p:sld>
 </file>
 
-<file path=ppt/slides/slide9.xml><?xml version="1.0" encoding="utf-8"?>
+<file path=ppt/slides/slide7.xml><?xml version="1.0" encoding="utf-8"?>
 <p:sld xmlns:a="http://schemas.openxmlformats.org/drawingml/2006/main" xmlns:r="http://schemas.openxmlformats.org/officeDocument/2006/relationships" xmlns:p="http://schemas.openxmlformats.org/presentationml/2006/main">
   <p:cSld>
     <p:spTree>
@@ -10960,6 +10540,461 @@
     <p:extLst>
       <p:ext uri="{BB962C8B-B14F-4D97-AF65-F5344CB8AC3E}">
         <p14:creationId xmlns:p14="http://schemas.microsoft.com/office/powerpoint/2010/main" val="471119101"/>
+      </p:ext>
+    </p:extLst>
+  </p:cSld>
+  <p:clrMapOvr>
+    <a:masterClrMapping/>
+  </p:clrMapOvr>
+</p:sld>
+</file>
+
+<file path=ppt/slides/slide8.xml><?xml version="1.0" encoding="utf-8"?>
+<p:sld xmlns:a="http://schemas.openxmlformats.org/drawingml/2006/main" xmlns:r="http://schemas.openxmlformats.org/officeDocument/2006/relationships" xmlns:p="http://schemas.openxmlformats.org/presentationml/2006/main">
+  <p:cSld>
+    <p:spTree>
+      <p:nvGrpSpPr>
+        <p:cNvPr id="1" name=""/>
+        <p:cNvGrpSpPr/>
+        <p:nvPr/>
+      </p:nvGrpSpPr>
+      <p:grpSpPr>
+        <a:xfrm>
+          <a:off x="0" y="0"/>
+          <a:ext cx="0" cy="0"/>
+          <a:chOff x="0" y="0"/>
+          <a:chExt cx="0" cy="0"/>
+        </a:xfrm>
+      </p:grpSpPr>
+      <p:grpSp>
+        <p:nvGrpSpPr>
+          <p:cNvPr id="4" name="Group 3">
+            <a:extLst>
+              <a:ext uri="{FF2B5EF4-FFF2-40B4-BE49-F238E27FC236}">
+                <a16:creationId xmlns:a16="http://schemas.microsoft.com/office/drawing/2014/main" id="{DA452823-8805-6CA2-B24B-7CFD46842F39}"/>
+              </a:ext>
+            </a:extLst>
+          </p:cNvPr>
+          <p:cNvGrpSpPr/>
+          <p:nvPr/>
+        </p:nvGrpSpPr>
+        <p:grpSpPr>
+          <a:xfrm>
+            <a:off x="0" y="0"/>
+            <a:ext cx="12192000" cy="1062869"/>
+            <a:chOff x="0" y="1062868"/>
+            <a:chExt cx="12192000" cy="1062869"/>
+          </a:xfrm>
+        </p:grpSpPr>
+        <p:sp>
+          <p:nvSpPr>
+            <p:cNvPr id="5" name="Rectangle 4">
+              <a:extLst>
+                <a:ext uri="{FF2B5EF4-FFF2-40B4-BE49-F238E27FC236}">
+                  <a16:creationId xmlns:a16="http://schemas.microsoft.com/office/drawing/2014/main" id="{98F38B91-67F6-78EB-AC88-AD7E690C8751}"/>
+                </a:ext>
+              </a:extLst>
+            </p:cNvPr>
+            <p:cNvSpPr/>
+            <p:nvPr/>
+          </p:nvSpPr>
+          <p:spPr>
+            <a:xfrm>
+              <a:off x="0" y="1062868"/>
+              <a:ext cx="12192000" cy="1062869"/>
+            </a:xfrm>
+            <a:prstGeom prst="rect">
+              <a:avLst/>
+            </a:prstGeom>
+            <a:solidFill>
+              <a:schemeClr val="tx1"/>
+            </a:solidFill>
+            <a:ln>
+              <a:solidFill>
+                <a:schemeClr val="tx1"/>
+              </a:solidFill>
+            </a:ln>
+          </p:spPr>
+          <p:style>
+            <a:lnRef idx="2">
+              <a:schemeClr val="accent1">
+                <a:shade val="50000"/>
+              </a:schemeClr>
+            </a:lnRef>
+            <a:fillRef idx="1">
+              <a:schemeClr val="accent1"/>
+            </a:fillRef>
+            <a:effectRef idx="0">
+              <a:schemeClr val="accent1"/>
+            </a:effectRef>
+            <a:fontRef idx="minor">
+              <a:schemeClr val="lt1"/>
+            </a:fontRef>
+          </p:style>
+          <p:txBody>
+            <a:bodyPr rtlCol="0" anchor="ctr"/>
+            <a:lstStyle/>
+            <a:p>
+              <a:pPr algn="ctr"/>
+              <a:r>
+                <a:rPr lang="en-US" sz="2400" dirty="0">
+                  <a:latin typeface="Copperplate Gothic Bold" panose="020E0705020206020404" pitchFamily="34" charset="0"/>
+                </a:rPr>
+                <a:t>Backend game setup</a:t>
+              </a:r>
+            </a:p>
+          </p:txBody>
+        </p:sp>
+        <p:pic>
+          <p:nvPicPr>
+            <p:cNvPr id="6" name="Picture 5">
+              <a:extLst>
+                <a:ext uri="{FF2B5EF4-FFF2-40B4-BE49-F238E27FC236}">
+                  <a16:creationId xmlns:a16="http://schemas.microsoft.com/office/drawing/2014/main" id="{F7AEB80D-B5C2-F6CE-5BD3-54119AFDD1B9}"/>
+                </a:ext>
+              </a:extLst>
+            </p:cNvPr>
+            <p:cNvPicPr>
+              <a:picLocks noChangeAspect="1"/>
+            </p:cNvPicPr>
+            <p:nvPr/>
+          </p:nvPicPr>
+          <p:blipFill>
+            <a:blip r:embed="rId2"/>
+            <a:stretch>
+              <a:fillRect/>
+            </a:stretch>
+          </p:blipFill>
+          <p:spPr>
+            <a:xfrm>
+              <a:off x="200025" y="1062868"/>
+              <a:ext cx="1419043" cy="1062869"/>
+            </a:xfrm>
+            <a:prstGeom prst="rect">
+              <a:avLst/>
+            </a:prstGeom>
+          </p:spPr>
+        </p:pic>
+      </p:grpSp>
+      <p:sp>
+        <p:nvSpPr>
+          <p:cNvPr id="7" name="TextBox 6">
+            <a:extLst>
+              <a:ext uri="{FF2B5EF4-FFF2-40B4-BE49-F238E27FC236}">
+                <a16:creationId xmlns:a16="http://schemas.microsoft.com/office/drawing/2014/main" id="{077BDDE9-ADCB-AB0B-D817-F08752B35F48}"/>
+              </a:ext>
+            </a:extLst>
+          </p:cNvPr>
+          <p:cNvSpPr txBox="1"/>
+          <p:nvPr/>
+        </p:nvSpPr>
+        <p:spPr>
+          <a:xfrm>
+            <a:off x="549524" y="1792836"/>
+            <a:ext cx="2829401" cy="1846659"/>
+          </a:xfrm>
+          <a:prstGeom prst="rect">
+            <a:avLst/>
+          </a:prstGeom>
+          <a:noFill/>
+        </p:spPr>
+        <p:txBody>
+          <a:bodyPr wrap="square" rtlCol="0">
+            <a:spAutoFit/>
+          </a:bodyPr>
+          <a:lstStyle/>
+          <a:p>
+            <a:pPr algn="ctr"/>
+            <a:r>
+              <a:rPr lang="en-US" sz="2400" b="1" dirty="0"/>
+              <a:t>Remix Solidity</a:t>
+            </a:r>
+          </a:p>
+          <a:p>
+            <a:pPr algn="ctr"/>
+            <a:endParaRPr lang="en-US" dirty="0"/>
+          </a:p>
+          <a:p>
+            <a:pPr algn="ctr"/>
+            <a:r>
+              <a:rPr lang="en-US" dirty="0"/>
+              <a:t>NFT Character types initiated and create game</a:t>
+            </a:r>
+          </a:p>
+          <a:p>
+            <a:pPr algn="ctr"/>
+            <a:endParaRPr lang="en-US" dirty="0"/>
+          </a:p>
+          <a:p>
+            <a:pPr algn="ctr"/>
+            <a:r>
+              <a:rPr lang="en-US" dirty="0" err="1"/>
+              <a:t>OrderAndChaos.sol</a:t>
+            </a:r>
+            <a:endParaRPr lang="en-US" dirty="0"/>
+          </a:p>
+        </p:txBody>
+      </p:sp>
+      <p:pic>
+        <p:nvPicPr>
+          <p:cNvPr id="3" name="Picture 2">
+            <a:extLst>
+              <a:ext uri="{FF2B5EF4-FFF2-40B4-BE49-F238E27FC236}">
+                <a16:creationId xmlns:a16="http://schemas.microsoft.com/office/drawing/2014/main" id="{85889458-72D7-50C1-B0E7-BAAD248D5A4D}"/>
+              </a:ext>
+            </a:extLst>
+          </p:cNvPr>
+          <p:cNvPicPr>
+            <a:picLocks noChangeAspect="1"/>
+          </p:cNvPicPr>
+          <p:nvPr/>
+        </p:nvPicPr>
+        <p:blipFill>
+          <a:blip r:embed="rId3"/>
+          <a:stretch>
+            <a:fillRect/>
+          </a:stretch>
+        </p:blipFill>
+        <p:spPr>
+          <a:xfrm>
+            <a:off x="4815839" y="1367245"/>
+            <a:ext cx="6615406" cy="5234306"/>
+          </a:xfrm>
+          <a:prstGeom prst="rect">
+            <a:avLst/>
+          </a:prstGeom>
+        </p:spPr>
+      </p:pic>
+    </p:spTree>
+    <p:extLst>
+      <p:ext uri="{BB962C8B-B14F-4D97-AF65-F5344CB8AC3E}">
+        <p14:creationId xmlns:p14="http://schemas.microsoft.com/office/powerpoint/2010/main" val="3298874469"/>
+      </p:ext>
+    </p:extLst>
+  </p:cSld>
+  <p:clrMapOvr>
+    <a:masterClrMapping/>
+  </p:clrMapOvr>
+</p:sld>
+</file>
+
+<file path=ppt/slides/slide9.xml><?xml version="1.0" encoding="utf-8"?>
+<p:sld xmlns:a="http://schemas.openxmlformats.org/drawingml/2006/main" xmlns:r="http://schemas.openxmlformats.org/officeDocument/2006/relationships" xmlns:p="http://schemas.openxmlformats.org/presentationml/2006/main">
+  <p:cSld>
+    <p:spTree>
+      <p:nvGrpSpPr>
+        <p:cNvPr id="1" name=""/>
+        <p:cNvGrpSpPr/>
+        <p:nvPr/>
+      </p:nvGrpSpPr>
+      <p:grpSpPr>
+        <a:xfrm>
+          <a:off x="0" y="0"/>
+          <a:ext cx="0" cy="0"/>
+          <a:chOff x="0" y="0"/>
+          <a:chExt cx="0" cy="0"/>
+        </a:xfrm>
+      </p:grpSpPr>
+      <p:grpSp>
+        <p:nvGrpSpPr>
+          <p:cNvPr id="4" name="Group 3">
+            <a:extLst>
+              <a:ext uri="{FF2B5EF4-FFF2-40B4-BE49-F238E27FC236}">
+                <a16:creationId xmlns:a16="http://schemas.microsoft.com/office/drawing/2014/main" id="{DA452823-8805-6CA2-B24B-7CFD46842F39}"/>
+              </a:ext>
+            </a:extLst>
+          </p:cNvPr>
+          <p:cNvGrpSpPr/>
+          <p:nvPr/>
+        </p:nvGrpSpPr>
+        <p:grpSpPr>
+          <a:xfrm>
+            <a:off x="0" y="0"/>
+            <a:ext cx="12192000" cy="1062869"/>
+            <a:chOff x="0" y="1062868"/>
+            <a:chExt cx="12192000" cy="1062869"/>
+          </a:xfrm>
+        </p:grpSpPr>
+        <p:sp>
+          <p:nvSpPr>
+            <p:cNvPr id="5" name="Rectangle 4">
+              <a:extLst>
+                <a:ext uri="{FF2B5EF4-FFF2-40B4-BE49-F238E27FC236}">
+                  <a16:creationId xmlns:a16="http://schemas.microsoft.com/office/drawing/2014/main" id="{98F38B91-67F6-78EB-AC88-AD7E690C8751}"/>
+                </a:ext>
+              </a:extLst>
+            </p:cNvPr>
+            <p:cNvSpPr/>
+            <p:nvPr/>
+          </p:nvSpPr>
+          <p:spPr>
+            <a:xfrm>
+              <a:off x="0" y="1062868"/>
+              <a:ext cx="12192000" cy="1062869"/>
+            </a:xfrm>
+            <a:prstGeom prst="rect">
+              <a:avLst/>
+            </a:prstGeom>
+            <a:solidFill>
+              <a:schemeClr val="tx1"/>
+            </a:solidFill>
+            <a:ln>
+              <a:solidFill>
+                <a:schemeClr val="tx1"/>
+              </a:solidFill>
+            </a:ln>
+          </p:spPr>
+          <p:style>
+            <a:lnRef idx="2">
+              <a:schemeClr val="accent1">
+                <a:shade val="50000"/>
+              </a:schemeClr>
+            </a:lnRef>
+            <a:fillRef idx="1">
+              <a:schemeClr val="accent1"/>
+            </a:fillRef>
+            <a:effectRef idx="0">
+              <a:schemeClr val="accent1"/>
+            </a:effectRef>
+            <a:fontRef idx="minor">
+              <a:schemeClr val="lt1"/>
+            </a:fontRef>
+          </p:style>
+          <p:txBody>
+            <a:bodyPr rtlCol="0" anchor="ctr"/>
+            <a:lstStyle/>
+            <a:p>
+              <a:pPr algn="ctr"/>
+              <a:r>
+                <a:rPr lang="en-US" sz="2400" dirty="0">
+                  <a:latin typeface="Copperplate Gothic Bold" panose="020E0705020206020404" pitchFamily="34" charset="0"/>
+                </a:rPr>
+                <a:t>Backend game setup</a:t>
+              </a:r>
+            </a:p>
+          </p:txBody>
+        </p:sp>
+        <p:pic>
+          <p:nvPicPr>
+            <p:cNvPr id="6" name="Picture 5">
+              <a:extLst>
+                <a:ext uri="{FF2B5EF4-FFF2-40B4-BE49-F238E27FC236}">
+                  <a16:creationId xmlns:a16="http://schemas.microsoft.com/office/drawing/2014/main" id="{F7AEB80D-B5C2-F6CE-5BD3-54119AFDD1B9}"/>
+                </a:ext>
+              </a:extLst>
+            </p:cNvPr>
+            <p:cNvPicPr>
+              <a:picLocks noChangeAspect="1"/>
+            </p:cNvPicPr>
+            <p:nvPr/>
+          </p:nvPicPr>
+          <p:blipFill>
+            <a:blip r:embed="rId2"/>
+            <a:stretch>
+              <a:fillRect/>
+            </a:stretch>
+          </p:blipFill>
+          <p:spPr>
+            <a:xfrm>
+              <a:off x="200025" y="1062868"/>
+              <a:ext cx="1419043" cy="1062869"/>
+            </a:xfrm>
+            <a:prstGeom prst="rect">
+              <a:avLst/>
+            </a:prstGeom>
+          </p:spPr>
+        </p:pic>
+      </p:grpSp>
+      <p:sp>
+        <p:nvSpPr>
+          <p:cNvPr id="7" name="TextBox 6">
+            <a:extLst>
+              <a:ext uri="{FF2B5EF4-FFF2-40B4-BE49-F238E27FC236}">
+                <a16:creationId xmlns:a16="http://schemas.microsoft.com/office/drawing/2014/main" id="{077BDDE9-ADCB-AB0B-D817-F08752B35F48}"/>
+              </a:ext>
+            </a:extLst>
+          </p:cNvPr>
+          <p:cNvSpPr txBox="1"/>
+          <p:nvPr/>
+        </p:nvSpPr>
+        <p:spPr>
+          <a:xfrm>
+            <a:off x="549524" y="1792836"/>
+            <a:ext cx="2829401" cy="1569660"/>
+          </a:xfrm>
+          <a:prstGeom prst="rect">
+            <a:avLst/>
+          </a:prstGeom>
+          <a:noFill/>
+        </p:spPr>
+        <p:txBody>
+          <a:bodyPr wrap="square" rtlCol="0">
+            <a:spAutoFit/>
+          </a:bodyPr>
+          <a:lstStyle/>
+          <a:p>
+            <a:pPr algn="ctr"/>
+            <a:r>
+              <a:rPr lang="en-US" sz="2400" b="1" dirty="0"/>
+              <a:t>Etherscan</a:t>
+            </a:r>
+          </a:p>
+          <a:p>
+            <a:pPr algn="ctr"/>
+            <a:endParaRPr lang="en-US" dirty="0"/>
+          </a:p>
+          <a:p>
+            <a:pPr algn="ctr"/>
+            <a:r>
+              <a:rPr lang="en-US" dirty="0"/>
+              <a:t>Proof of transaction on Rinkeby Testnet Network</a:t>
+            </a:r>
+          </a:p>
+          <a:p>
+            <a:pPr algn="ctr"/>
+            <a:endParaRPr lang="en-US" dirty="0"/>
+          </a:p>
+        </p:txBody>
+      </p:sp>
+      <p:pic>
+        <p:nvPicPr>
+          <p:cNvPr id="2" name="Picture 1">
+            <a:extLst>
+              <a:ext uri="{FF2B5EF4-FFF2-40B4-BE49-F238E27FC236}">
+                <a16:creationId xmlns:a16="http://schemas.microsoft.com/office/drawing/2014/main" id="{D6C66D85-8052-C0C6-E9A0-3F4C93A4B66D}"/>
+              </a:ext>
+            </a:extLst>
+          </p:cNvPr>
+          <p:cNvPicPr>
+            <a:picLocks noChangeAspect="1"/>
+          </p:cNvPicPr>
+          <p:nvPr/>
+        </p:nvPicPr>
+        <p:blipFill>
+          <a:blip r:embed="rId3"/>
+          <a:stretch>
+            <a:fillRect/>
+          </a:stretch>
+        </p:blipFill>
+        <p:spPr>
+          <a:xfrm>
+            <a:off x="5034876" y="1416131"/>
+            <a:ext cx="6825314" cy="5289470"/>
+          </a:xfrm>
+          <a:prstGeom prst="rect">
+            <a:avLst/>
+          </a:prstGeom>
+          <a:ln>
+            <a:solidFill>
+              <a:schemeClr val="tx1"/>
+            </a:solidFill>
+          </a:ln>
+        </p:spPr>
+      </p:pic>
+    </p:spTree>
+    <p:extLst>
+      <p:ext uri="{BB962C8B-B14F-4D97-AF65-F5344CB8AC3E}">
+        <p14:creationId xmlns:p14="http://schemas.microsoft.com/office/powerpoint/2010/main" val="3145065351"/>
       </p:ext>
     </p:extLst>
   </p:cSld>

</xml_diff>